<commit_message>
Updated the Tools Carousel images to include text clarifying the tool ...
Also improved the main index.html page to link to Game

Still need to redesign index.html and streamline the intro content and introduce "Get Started" ....
</commit_message>
<xml_diff>
--- a/trunk/web_site/V3/images/images.pptx
+++ b/trunk/web_site/V3/images/images.pptx
@@ -289,7 +289,7 @@
             <a:fld id="{1D8BD707-D9CF-40AE-B4C6-C98DA3205C09}" type="datetimeFigureOut">
               <a:rPr lang="en-US" smtClean="0"/>
               <a:pPr/>
-              <a:t>1/23/2013</a:t>
+              <a:t>5/18/2013</a:t>
             </a:fld>
             <a:endParaRPr lang="en-US"/>
           </a:p>
@@ -456,7 +456,7 @@
             <a:fld id="{1D8BD707-D9CF-40AE-B4C6-C98DA3205C09}" type="datetimeFigureOut">
               <a:rPr lang="en-US" smtClean="0"/>
               <a:pPr/>
-              <a:t>1/23/2013</a:t>
+              <a:t>5/18/2013</a:t>
             </a:fld>
             <a:endParaRPr lang="en-US"/>
           </a:p>
@@ -633,7 +633,7 @@
             <a:fld id="{1D8BD707-D9CF-40AE-B4C6-C98DA3205C09}" type="datetimeFigureOut">
               <a:rPr lang="en-US" smtClean="0"/>
               <a:pPr/>
-              <a:t>1/23/2013</a:t>
+              <a:t>5/18/2013</a:t>
             </a:fld>
             <a:endParaRPr lang="en-US"/>
           </a:p>
@@ -800,7 +800,7 @@
             <a:fld id="{1D8BD707-D9CF-40AE-B4C6-C98DA3205C09}" type="datetimeFigureOut">
               <a:rPr lang="en-US" smtClean="0"/>
               <a:pPr/>
-              <a:t>1/23/2013</a:t>
+              <a:t>5/18/2013</a:t>
             </a:fld>
             <a:endParaRPr lang="en-US"/>
           </a:p>
@@ -1043,7 +1043,7 @@
             <a:fld id="{1D8BD707-D9CF-40AE-B4C6-C98DA3205C09}" type="datetimeFigureOut">
               <a:rPr lang="en-US" smtClean="0"/>
               <a:pPr/>
-              <a:t>1/23/2013</a:t>
+              <a:t>5/18/2013</a:t>
             </a:fld>
             <a:endParaRPr lang="en-US"/>
           </a:p>
@@ -1328,7 +1328,7 @@
             <a:fld id="{1D8BD707-D9CF-40AE-B4C6-C98DA3205C09}" type="datetimeFigureOut">
               <a:rPr lang="en-US" smtClean="0"/>
               <a:pPr/>
-              <a:t>1/23/2013</a:t>
+              <a:t>5/18/2013</a:t>
             </a:fld>
             <a:endParaRPr lang="en-US"/>
           </a:p>
@@ -1747,7 +1747,7 @@
             <a:fld id="{1D8BD707-D9CF-40AE-B4C6-C98DA3205C09}" type="datetimeFigureOut">
               <a:rPr lang="en-US" smtClean="0"/>
               <a:pPr/>
-              <a:t>1/23/2013</a:t>
+              <a:t>5/18/2013</a:t>
             </a:fld>
             <a:endParaRPr lang="en-US"/>
           </a:p>
@@ -1862,7 +1862,7 @@
             <a:fld id="{1D8BD707-D9CF-40AE-B4C6-C98DA3205C09}" type="datetimeFigureOut">
               <a:rPr lang="en-US" smtClean="0"/>
               <a:pPr/>
-              <a:t>1/23/2013</a:t>
+              <a:t>5/18/2013</a:t>
             </a:fld>
             <a:endParaRPr lang="en-US"/>
           </a:p>
@@ -1954,7 +1954,7 @@
             <a:fld id="{1D8BD707-D9CF-40AE-B4C6-C98DA3205C09}" type="datetimeFigureOut">
               <a:rPr lang="en-US" smtClean="0"/>
               <a:pPr/>
-              <a:t>1/23/2013</a:t>
+              <a:t>5/18/2013</a:t>
             </a:fld>
             <a:endParaRPr lang="en-US"/>
           </a:p>
@@ -2228,7 +2228,7 @@
             <a:fld id="{1D8BD707-D9CF-40AE-B4C6-C98DA3205C09}" type="datetimeFigureOut">
               <a:rPr lang="en-US" smtClean="0"/>
               <a:pPr/>
-              <a:t>1/23/2013</a:t>
+              <a:t>5/18/2013</a:t>
             </a:fld>
             <a:endParaRPr lang="en-US"/>
           </a:p>
@@ -2478,7 +2478,7 @@
             <a:fld id="{1D8BD707-D9CF-40AE-B4C6-C98DA3205C09}" type="datetimeFigureOut">
               <a:rPr lang="en-US" smtClean="0"/>
               <a:pPr/>
-              <a:t>1/23/2013</a:t>
+              <a:t>5/18/2013</a:t>
             </a:fld>
             <a:endParaRPr lang="en-US"/>
           </a:p>
@@ -2688,7 +2688,7 @@
             <a:fld id="{1D8BD707-D9CF-40AE-B4C6-C98DA3205C09}" type="datetimeFigureOut">
               <a:rPr lang="en-US" smtClean="0"/>
               <a:pPr/>
-              <a:t>1/23/2013</a:t>
+              <a:t>5/18/2013</a:t>
             </a:fld>
             <a:endParaRPr lang="en-US"/>
           </a:p>
@@ -3059,81 +3059,652 @@
           <a:chExt cx="0" cy="0"/>
         </a:xfrm>
       </p:grpSpPr>
-      <p:pic>
-        <p:nvPicPr>
-          <p:cNvPr id="1026" name="Picture 2"/>
-          <p:cNvPicPr>
-            <a:picLocks noChangeAspect="1" noChangeArrowheads="1"/>
-          </p:cNvPicPr>
+      <p:grpSp>
+        <p:nvGrpSpPr>
+          <p:cNvPr id="4" name="Group 3"/>
+          <p:cNvGrpSpPr/>
           <p:nvPr/>
-        </p:nvPicPr>
-        <p:blipFill rotWithShape="1">
-          <a:blip r:embed="rId2">
-            <a:extLst>
-              <a:ext uri="{28A0092B-C50C-407E-A947-70E740481C1C}">
-                <a14:useLocalDpi xmlns:a14="http://schemas.microsoft.com/office/drawing/2010/main" val="0"/>
-              </a:ext>
-            </a:extLst>
-          </a:blip>
-          <a:srcRect l="19607" t="43000" r="53821" b="22143"/>
-          <a:stretch/>
-        </p:blipFill>
-        <p:spPr bwMode="auto">
+        </p:nvGrpSpPr>
+        <p:grpSpPr>
           <a:xfrm>
             <a:off x="381000" y="381000"/>
             <a:ext cx="2699657" cy="2656114"/>
+            <a:chOff x="381000" y="381000"/>
+            <a:chExt cx="2699657" cy="2656114"/>
           </a:xfrm>
-          <a:prstGeom prst="roundRect">
-            <a:avLst>
-              <a:gd name="adj" fmla="val 11111"/>
-            </a:avLst>
-          </a:prstGeom>
-          <a:ln w="190500" cap="rnd">
-            <a:solidFill>
-              <a:srgbClr val="C8C6BD"/>
-            </a:solidFill>
-            <a:prstDash val="solid"/>
-          </a:ln>
-          <a:effectLst>
-            <a:outerShdw blurRad="101600" dist="50800" dir="7200000" algn="tl" rotWithShape="0">
-              <a:srgbClr val="000000">
-                <a:alpha val="45000"/>
-              </a:srgbClr>
-            </a:outerShdw>
-          </a:effectLst>
-          <a:scene3d>
-            <a:camera prst="perspectiveFront" fov="5400000"/>
-            <a:lightRig rig="threePt" dir="t">
-              <a:rot lat="0" lon="0" rev="19200000"/>
-            </a:lightRig>
-          </a:scene3d>
-          <a:sp3d extrusionH="25400">
-            <a:bevelT w="304800" h="152400" prst="hardEdge"/>
-            <a:extrusionClr>
-              <a:srgbClr val="FFFFFF"/>
-            </a:extrusionClr>
-          </a:sp3d>
-          <a:extLst>
-            <a:ext uri="{909E8E84-426E-40DD-AFC4-6F175D3DCCD1}">
-              <a14:hiddenFill xmlns:a14="http://schemas.microsoft.com/office/drawing/2010/main">
-                <a:solidFill>
-                  <a:schemeClr val="accent1"/>
-                </a:solidFill>
-              </a14:hiddenFill>
-            </a:ext>
-          </a:extLst>
-        </p:spPr>
-      </p:pic>
+        </p:grpSpPr>
+        <p:pic>
+          <p:nvPicPr>
+            <p:cNvPr id="1026" name="Picture 2"/>
+            <p:cNvPicPr>
+              <a:picLocks noChangeAspect="1" noChangeArrowheads="1"/>
+            </p:cNvPicPr>
+            <p:nvPr/>
+          </p:nvPicPr>
+          <p:blipFill rotWithShape="1">
+            <a:blip r:embed="rId2">
+              <a:extLst>
+                <a:ext uri="{28A0092B-C50C-407E-A947-70E740481C1C}">
+                  <a14:useLocalDpi xmlns:a14="http://schemas.microsoft.com/office/drawing/2010/main" val="0"/>
+                </a:ext>
+              </a:extLst>
+            </a:blip>
+            <a:srcRect l="19607" t="43000" r="53821" b="22143"/>
+            <a:stretch/>
+          </p:blipFill>
+          <p:spPr bwMode="auto">
+            <a:xfrm>
+              <a:off x="381000" y="381000"/>
+              <a:ext cx="2699657" cy="2656114"/>
+            </a:xfrm>
+            <a:prstGeom prst="roundRect">
+              <a:avLst>
+                <a:gd name="adj" fmla="val 11111"/>
+              </a:avLst>
+            </a:prstGeom>
+            <a:ln w="190500" cap="rnd">
+              <a:solidFill>
+                <a:srgbClr val="C8C6BD"/>
+              </a:solidFill>
+              <a:prstDash val="solid"/>
+            </a:ln>
+            <a:effectLst>
+              <a:outerShdw blurRad="101600" dist="50800" dir="7200000" algn="tl" rotWithShape="0">
+                <a:srgbClr val="000000">
+                  <a:alpha val="45000"/>
+                </a:srgbClr>
+              </a:outerShdw>
+            </a:effectLst>
+            <a:scene3d>
+              <a:camera prst="perspectiveFront" fov="5400000"/>
+              <a:lightRig rig="threePt" dir="t">
+                <a:rot lat="0" lon="0" rev="19200000"/>
+              </a:lightRig>
+            </a:scene3d>
+            <a:sp3d extrusionH="25400">
+              <a:bevelT w="304800" h="152400" prst="hardEdge"/>
+              <a:extrusionClr>
+                <a:srgbClr val="FFFFFF"/>
+              </a:extrusionClr>
+            </a:sp3d>
+            <a:extLst>
+              <a:ext uri="{909E8E84-426E-40DD-AFC4-6F175D3DCCD1}">
+                <a14:hiddenFill xmlns:a14="http://schemas.microsoft.com/office/drawing/2010/main">
+                  <a:solidFill>
+                    <a:schemeClr val="accent1"/>
+                  </a:solidFill>
+                </a14:hiddenFill>
+              </a:ext>
+            </a:extLst>
+          </p:spPr>
+        </p:pic>
+        <p:sp>
+          <p:nvSpPr>
+            <p:cNvPr id="3" name="TextBox 2"/>
+            <p:cNvSpPr txBox="1"/>
+            <p:nvPr/>
+          </p:nvSpPr>
+          <p:spPr>
+            <a:xfrm>
+              <a:off x="609600" y="469612"/>
+              <a:ext cx="2295821" cy="646331"/>
+            </a:xfrm>
+            <a:prstGeom prst="rect">
+              <a:avLst/>
+            </a:prstGeom>
+            <a:noFill/>
+          </p:spPr>
+          <p:txBody>
+            <a:bodyPr wrap="none" rtlCol="0">
+              <a:spAutoFit/>
+            </a:bodyPr>
+            <a:lstStyle/>
+            <a:p>
+              <a:r>
+                <a:rPr lang="en-US" sz="3600" b="1" dirty="0" smtClean="0"/>
+                <a:t>Calculators</a:t>
+              </a:r>
+              <a:endParaRPr lang="en-US" sz="3200" b="1" dirty="0"/>
+            </a:p>
+          </p:txBody>
+        </p:sp>
+      </p:grpSp>
+      <p:grpSp>
+        <p:nvGrpSpPr>
+          <p:cNvPr id="7" name="Group 6"/>
+          <p:cNvGrpSpPr/>
+          <p:nvPr/>
+        </p:nvGrpSpPr>
+        <p:grpSpPr>
+          <a:xfrm>
+            <a:off x="3581400" y="76200"/>
+            <a:ext cx="3048000" cy="2794000"/>
+            <a:chOff x="3581400" y="76200"/>
+            <a:chExt cx="3048000" cy="2794000"/>
+          </a:xfrm>
+        </p:grpSpPr>
+        <p:pic>
+          <p:nvPicPr>
+            <p:cNvPr id="1027" name="Picture 3" descr="C:\Users\Ivo\Desktop\simulator.png"/>
+            <p:cNvPicPr>
+              <a:picLocks noChangeAspect="1" noChangeArrowheads="1"/>
+            </p:cNvPicPr>
+            <p:nvPr/>
+          </p:nvPicPr>
+          <p:blipFill>
+            <a:blip r:embed="rId3">
+              <a:extLst>
+                <a:ext uri="{28A0092B-C50C-407E-A947-70E740481C1C}">
+                  <a14:useLocalDpi xmlns:a14="http://schemas.microsoft.com/office/drawing/2010/main" val="0"/>
+                </a:ext>
+              </a:extLst>
+            </a:blip>
+            <a:srcRect/>
+            <a:stretch>
+              <a:fillRect/>
+            </a:stretch>
+          </p:blipFill>
+          <p:spPr bwMode="auto">
+            <a:xfrm>
+              <a:off x="3581400" y="76200"/>
+              <a:ext cx="3048000" cy="2794000"/>
+            </a:xfrm>
+            <a:prstGeom prst="roundRect">
+              <a:avLst>
+                <a:gd name="adj" fmla="val 11111"/>
+              </a:avLst>
+            </a:prstGeom>
+            <a:ln w="190500" cap="rnd">
+              <a:solidFill>
+                <a:srgbClr val="C8C6BD"/>
+              </a:solidFill>
+              <a:prstDash val="solid"/>
+            </a:ln>
+            <a:effectLst>
+              <a:outerShdw blurRad="101600" dist="50800" dir="7200000" algn="tl" rotWithShape="0">
+                <a:srgbClr val="000000">
+                  <a:alpha val="45000"/>
+                </a:srgbClr>
+              </a:outerShdw>
+            </a:effectLst>
+            <a:scene3d>
+              <a:camera prst="perspectiveFront" fov="5400000"/>
+              <a:lightRig rig="threePt" dir="t">
+                <a:rot lat="0" lon="0" rev="19200000"/>
+              </a:lightRig>
+            </a:scene3d>
+            <a:sp3d extrusionH="25400">
+              <a:bevelT w="304800" h="152400" prst="hardEdge"/>
+              <a:extrusionClr>
+                <a:srgbClr val="FFFFFF"/>
+              </a:extrusionClr>
+            </a:sp3d>
+            <a:extLst>
+              <a:ext uri="{909E8E84-426E-40DD-AFC4-6F175D3DCCD1}">
+                <a14:hiddenFill xmlns:a14="http://schemas.microsoft.com/office/drawing/2010/main">
+                  <a:solidFill>
+                    <a:srgbClr val="FFFFFF"/>
+                  </a:solidFill>
+                </a14:hiddenFill>
+              </a:ext>
+            </a:extLst>
+          </p:spPr>
+        </p:pic>
+        <p:sp>
+          <p:nvSpPr>
+            <p:cNvPr id="11" name="TextBox 10"/>
+            <p:cNvSpPr txBox="1"/>
+            <p:nvPr/>
+          </p:nvSpPr>
+          <p:spPr>
+            <a:xfrm>
+              <a:off x="4114800" y="152400"/>
+              <a:ext cx="2223686" cy="646331"/>
+            </a:xfrm>
+            <a:prstGeom prst="rect">
+              <a:avLst/>
+            </a:prstGeom>
+            <a:noFill/>
+          </p:spPr>
+          <p:txBody>
+            <a:bodyPr wrap="none" rtlCol="0">
+              <a:spAutoFit/>
+            </a:bodyPr>
+            <a:lstStyle/>
+            <a:p>
+              <a:r>
+                <a:rPr lang="en-US" sz="3600" b="1" dirty="0" smtClean="0"/>
+                <a:t>Simulators</a:t>
+              </a:r>
+              <a:endParaRPr lang="en-US" sz="3200" b="1" dirty="0"/>
+            </a:p>
+          </p:txBody>
+        </p:sp>
+      </p:grpSp>
+      <p:grpSp>
+        <p:nvGrpSpPr>
+          <p:cNvPr id="16" name="Group 15"/>
+          <p:cNvGrpSpPr/>
+          <p:nvPr/>
+        </p:nvGrpSpPr>
+        <p:grpSpPr>
+          <a:xfrm>
+            <a:off x="-109537" y="3441899"/>
+            <a:ext cx="3081338" cy="3209726"/>
+            <a:chOff x="-109537" y="3441899"/>
+            <a:chExt cx="3081338" cy="3209726"/>
+          </a:xfrm>
+        </p:grpSpPr>
+        <p:pic>
+          <p:nvPicPr>
+            <p:cNvPr id="1028" name="Picture 4" descr="C:\Users\Ivo\Desktop\Game1.jpg"/>
+            <p:cNvPicPr>
+              <a:picLocks noChangeAspect="1" noChangeArrowheads="1"/>
+            </p:cNvPicPr>
+            <p:nvPr/>
+          </p:nvPicPr>
+          <p:blipFill>
+            <a:blip r:embed="rId4">
+              <a:extLst>
+                <a:ext uri="{28A0092B-C50C-407E-A947-70E740481C1C}">
+                  <a14:useLocalDpi xmlns:a14="http://schemas.microsoft.com/office/drawing/2010/main" val="0"/>
+                </a:ext>
+              </a:extLst>
+            </a:blip>
+            <a:srcRect/>
+            <a:stretch>
+              <a:fillRect/>
+            </a:stretch>
+          </p:blipFill>
+          <p:spPr bwMode="auto">
+            <a:xfrm>
+              <a:off x="-109537" y="3441899"/>
+              <a:ext cx="3081338" cy="3209726"/>
+            </a:xfrm>
+            <a:prstGeom prst="roundRect">
+              <a:avLst>
+                <a:gd name="adj" fmla="val 11111"/>
+              </a:avLst>
+            </a:prstGeom>
+            <a:ln w="190500" cap="rnd">
+              <a:solidFill>
+                <a:srgbClr val="C8C6BD"/>
+              </a:solidFill>
+              <a:prstDash val="solid"/>
+            </a:ln>
+            <a:effectLst>
+              <a:outerShdw blurRad="101600" dist="50800" dir="7200000" algn="tl" rotWithShape="0">
+                <a:srgbClr val="000000">
+                  <a:alpha val="45000"/>
+                </a:srgbClr>
+              </a:outerShdw>
+            </a:effectLst>
+            <a:scene3d>
+              <a:camera prst="perspectiveFront" fov="5400000"/>
+              <a:lightRig rig="threePt" dir="t">
+                <a:rot lat="0" lon="0" rev="19200000"/>
+              </a:lightRig>
+            </a:scene3d>
+            <a:sp3d extrusionH="25400">
+              <a:bevelT w="304800" h="152400" prst="hardEdge"/>
+              <a:extrusionClr>
+                <a:srgbClr val="FFFFFF"/>
+              </a:extrusionClr>
+            </a:sp3d>
+            <a:extLst>
+              <a:ext uri="{909E8E84-426E-40DD-AFC4-6F175D3DCCD1}">
+                <a14:hiddenFill xmlns:a14="http://schemas.microsoft.com/office/drawing/2010/main">
+                  <a:solidFill>
+                    <a:srgbClr val="FFFFFF"/>
+                  </a:solidFill>
+                </a14:hiddenFill>
+              </a:ext>
+            </a:extLst>
+          </p:spPr>
+        </p:pic>
+        <p:sp>
+          <p:nvSpPr>
+            <p:cNvPr id="12" name="TextBox 11"/>
+            <p:cNvSpPr txBox="1"/>
+            <p:nvPr/>
+          </p:nvSpPr>
+          <p:spPr>
+            <a:xfrm>
+              <a:off x="1313983" y="4633694"/>
+              <a:ext cx="1462132" cy="646331"/>
+            </a:xfrm>
+            <a:prstGeom prst="rect">
+              <a:avLst/>
+            </a:prstGeom>
+            <a:noFill/>
+          </p:spPr>
+          <p:txBody>
+            <a:bodyPr wrap="none" rtlCol="0">
+              <a:spAutoFit/>
+            </a:bodyPr>
+            <a:lstStyle/>
+            <a:p>
+              <a:r>
+                <a:rPr lang="en-US" sz="3600" b="1" dirty="0" smtClean="0"/>
+                <a:t>Search</a:t>
+              </a:r>
+              <a:endParaRPr lang="en-US" sz="3200" b="1" dirty="0"/>
+            </a:p>
+          </p:txBody>
+        </p:sp>
+      </p:grpSp>
+      <p:grpSp>
+        <p:nvGrpSpPr>
+          <p:cNvPr id="9" name="Group 8"/>
+          <p:cNvGrpSpPr/>
+          <p:nvPr/>
+        </p:nvGrpSpPr>
+        <p:grpSpPr>
+          <a:xfrm>
+            <a:off x="9167272" y="4380131"/>
+            <a:ext cx="3213100" cy="3602941"/>
+            <a:chOff x="3147157" y="3113313"/>
+            <a:chExt cx="3213100" cy="3602941"/>
+          </a:xfrm>
+        </p:grpSpPr>
+        <p:pic>
+          <p:nvPicPr>
+            <p:cNvPr id="1030" name="Picture 6" descr="C:\Users\Ivo\Desktop\Picture1.png"/>
+            <p:cNvPicPr>
+              <a:picLocks noChangeAspect="1" noChangeArrowheads="1"/>
+            </p:cNvPicPr>
+            <p:nvPr/>
+          </p:nvPicPr>
+          <p:blipFill>
+            <a:blip r:embed="rId5">
+              <a:extLst>
+                <a:ext uri="{28A0092B-C50C-407E-A947-70E740481C1C}">
+                  <a14:useLocalDpi xmlns:a14="http://schemas.microsoft.com/office/drawing/2010/main" val="0"/>
+                </a:ext>
+              </a:extLst>
+            </a:blip>
+            <a:srcRect/>
+            <a:stretch>
+              <a:fillRect/>
+            </a:stretch>
+          </p:blipFill>
+          <p:spPr bwMode="auto">
+            <a:xfrm>
+              <a:off x="3147157" y="3113313"/>
+              <a:ext cx="3213100" cy="3279775"/>
+            </a:xfrm>
+            <a:prstGeom prst="rect">
+              <a:avLst/>
+            </a:prstGeom>
+            <a:ln>
+              <a:noFill/>
+            </a:ln>
+            <a:effectLst>
+              <a:outerShdw blurRad="292100" dist="139700" dir="2700000" algn="tl" rotWithShape="0">
+                <a:srgbClr val="333333">
+                  <a:alpha val="65000"/>
+                </a:srgbClr>
+              </a:outerShdw>
+            </a:effectLst>
+            <a:extLst>
+              <a:ext uri="{909E8E84-426E-40DD-AFC4-6F175D3DCCD1}">
+                <a14:hiddenFill xmlns:a14="http://schemas.microsoft.com/office/drawing/2010/main">
+                  <a:solidFill>
+                    <a:srgbClr val="FFFFFF"/>
+                  </a:solidFill>
+                </a14:hiddenFill>
+              </a:ext>
+            </a:extLst>
+          </p:spPr>
+        </p:pic>
+        <p:sp>
+          <p:nvSpPr>
+            <p:cNvPr id="13" name="TextBox 12"/>
+            <p:cNvSpPr txBox="1"/>
+            <p:nvPr/>
+          </p:nvSpPr>
+          <p:spPr>
+            <a:xfrm>
+              <a:off x="3731215" y="6069923"/>
+              <a:ext cx="2044983" cy="646331"/>
+            </a:xfrm>
+            <a:prstGeom prst="rect">
+              <a:avLst/>
+            </a:prstGeom>
+            <a:noFill/>
+          </p:spPr>
+          <p:txBody>
+            <a:bodyPr wrap="none" rtlCol="0">
+              <a:spAutoFit/>
+            </a:bodyPr>
+            <a:lstStyle/>
+            <a:p>
+              <a:r>
+                <a:rPr lang="en-US" sz="3600" b="1" dirty="0" smtClean="0"/>
+                <a:t>Navigator</a:t>
+              </a:r>
+              <a:endParaRPr lang="en-US" sz="3200" b="1" dirty="0"/>
+            </a:p>
+          </p:txBody>
+        </p:sp>
+      </p:grpSp>
+      <p:grpSp>
+        <p:nvGrpSpPr>
+          <p:cNvPr id="8" name="Group 7"/>
+          <p:cNvGrpSpPr/>
+          <p:nvPr/>
+        </p:nvGrpSpPr>
+        <p:grpSpPr>
+          <a:xfrm>
+            <a:off x="6198054" y="5280025"/>
+            <a:ext cx="2543175" cy="2857500"/>
+            <a:chOff x="6261100" y="3851275"/>
+            <a:chExt cx="2543175" cy="2857500"/>
+          </a:xfrm>
+        </p:grpSpPr>
+        <p:pic>
+          <p:nvPicPr>
+            <p:cNvPr id="2" name="Picture 2" descr="C:\Users\Ivo\Desktop\Game.png"/>
+            <p:cNvPicPr>
+              <a:picLocks noChangeAspect="1" noChangeArrowheads="1"/>
+            </p:cNvPicPr>
+            <p:nvPr/>
+          </p:nvPicPr>
+          <p:blipFill>
+            <a:blip r:embed="rId6">
+              <a:extLst>
+                <a:ext uri="{28A0092B-C50C-407E-A947-70E740481C1C}">
+                  <a14:useLocalDpi xmlns:a14="http://schemas.microsoft.com/office/drawing/2010/main" val="0"/>
+                </a:ext>
+              </a:extLst>
+            </a:blip>
+            <a:srcRect/>
+            <a:stretch>
+              <a:fillRect/>
+            </a:stretch>
+          </p:blipFill>
+          <p:spPr bwMode="auto">
+            <a:xfrm flipH="1">
+              <a:off x="6261100" y="3851275"/>
+              <a:ext cx="2543175" cy="2857500"/>
+            </a:xfrm>
+            <a:prstGeom prst="roundRect">
+              <a:avLst>
+                <a:gd name="adj" fmla="val 11111"/>
+              </a:avLst>
+            </a:prstGeom>
+            <a:ln w="190500" cap="rnd">
+              <a:solidFill>
+                <a:srgbClr val="C8C6BD"/>
+              </a:solidFill>
+              <a:prstDash val="solid"/>
+            </a:ln>
+            <a:effectLst>
+              <a:outerShdw blurRad="101600" dist="50800" dir="7200000" algn="tl" rotWithShape="0">
+                <a:srgbClr val="000000">
+                  <a:alpha val="45000"/>
+                </a:srgbClr>
+              </a:outerShdw>
+            </a:effectLst>
+            <a:scene3d>
+              <a:camera prst="perspectiveFront" fov="5400000"/>
+              <a:lightRig rig="threePt" dir="t">
+                <a:rot lat="0" lon="0" rev="19200000"/>
+              </a:lightRig>
+            </a:scene3d>
+            <a:sp3d extrusionH="25400">
+              <a:bevelT w="304800" h="152400" prst="hardEdge"/>
+              <a:extrusionClr>
+                <a:srgbClr val="FFFFFF"/>
+              </a:extrusionClr>
+            </a:sp3d>
+            <a:extLst>
+              <a:ext uri="{909E8E84-426E-40DD-AFC4-6F175D3DCCD1}">
+                <a14:hiddenFill xmlns:a14="http://schemas.microsoft.com/office/drawing/2010/main">
+                  <a:solidFill>
+                    <a:srgbClr val="FFFFFF"/>
+                  </a:solidFill>
+                </a14:hiddenFill>
+              </a:ext>
+            </a:extLst>
+          </p:spPr>
+        </p:pic>
+        <p:sp>
+          <p:nvSpPr>
+            <p:cNvPr id="14" name="TextBox 13"/>
+            <p:cNvSpPr txBox="1"/>
+            <p:nvPr/>
+          </p:nvSpPr>
+          <p:spPr>
+            <a:xfrm>
+              <a:off x="7448216" y="6005294"/>
+              <a:ext cx="1314784" cy="646331"/>
+            </a:xfrm>
+            <a:prstGeom prst="rect">
+              <a:avLst/>
+            </a:prstGeom>
+            <a:noFill/>
+          </p:spPr>
+          <p:txBody>
+            <a:bodyPr wrap="none" rtlCol="0">
+              <a:spAutoFit/>
+            </a:bodyPr>
+            <a:lstStyle/>
+            <a:p>
+              <a:r>
+                <a:rPr lang="en-US" sz="3600" b="1" dirty="0" smtClean="0"/>
+                <a:t>Game</a:t>
+              </a:r>
+              <a:endParaRPr lang="en-US" sz="3200" b="1" dirty="0"/>
+            </a:p>
+          </p:txBody>
+        </p:sp>
+      </p:grpSp>
+      <p:grpSp>
+        <p:nvGrpSpPr>
+          <p:cNvPr id="5" name="Group 4"/>
+          <p:cNvGrpSpPr/>
+          <p:nvPr/>
+        </p:nvGrpSpPr>
+        <p:grpSpPr>
+          <a:xfrm>
+            <a:off x="9751330" y="-181194"/>
+            <a:ext cx="2713037" cy="3051394"/>
+            <a:chOff x="6735763" y="-42863"/>
+            <a:chExt cx="2713037" cy="3051394"/>
+          </a:xfrm>
+        </p:grpSpPr>
+        <p:pic>
+          <p:nvPicPr>
+            <p:cNvPr id="1031" name="Picture 7" descr="C:\Users\Ivo\Desktop\canvas.png"/>
+            <p:cNvPicPr>
+              <a:picLocks noChangeAspect="1" noChangeArrowheads="1"/>
+            </p:cNvPicPr>
+            <p:nvPr/>
+          </p:nvPicPr>
+          <p:blipFill>
+            <a:blip r:embed="rId7">
+              <a:extLst>
+                <a:ext uri="{28A0092B-C50C-407E-A947-70E740481C1C}">
+                  <a14:useLocalDpi xmlns:a14="http://schemas.microsoft.com/office/drawing/2010/main" val="0"/>
+                </a:ext>
+              </a:extLst>
+            </a:blip>
+            <a:srcRect/>
+            <a:stretch>
+              <a:fillRect/>
+            </a:stretch>
+          </p:blipFill>
+          <p:spPr bwMode="auto">
+            <a:xfrm>
+              <a:off x="6735763" y="-42863"/>
+              <a:ext cx="2713037" cy="2674827"/>
+            </a:xfrm>
+            <a:prstGeom prst="rect">
+              <a:avLst/>
+            </a:prstGeom>
+            <a:ln>
+              <a:noFill/>
+            </a:ln>
+            <a:effectLst>
+              <a:outerShdw blurRad="292100" dist="139700" dir="2700000" algn="tl" rotWithShape="0">
+                <a:srgbClr val="333333">
+                  <a:alpha val="65000"/>
+                </a:srgbClr>
+              </a:outerShdw>
+            </a:effectLst>
+            <a:extLst>
+              <a:ext uri="{909E8E84-426E-40DD-AFC4-6F175D3DCCD1}">
+                <a14:hiddenFill xmlns:a14="http://schemas.microsoft.com/office/drawing/2010/main">
+                  <a:solidFill>
+                    <a:srgbClr val="FFFFFF"/>
+                  </a:solidFill>
+                </a14:hiddenFill>
+              </a:ext>
+            </a:extLst>
+          </p:spPr>
+        </p:pic>
+        <p:sp>
+          <p:nvSpPr>
+            <p:cNvPr id="15" name="TextBox 14"/>
+            <p:cNvSpPr txBox="1"/>
+            <p:nvPr/>
+          </p:nvSpPr>
+          <p:spPr>
+            <a:xfrm>
+              <a:off x="6804652" y="2362200"/>
+              <a:ext cx="2575257" cy="646331"/>
+            </a:xfrm>
+            <a:prstGeom prst="rect">
+              <a:avLst/>
+            </a:prstGeom>
+            <a:noFill/>
+          </p:spPr>
+          <p:txBody>
+            <a:bodyPr wrap="none" rtlCol="0">
+              <a:spAutoFit/>
+            </a:bodyPr>
+            <a:lstStyle/>
+            <a:p>
+              <a:r>
+                <a:rPr lang="en-US" sz="3600" b="1" dirty="0" smtClean="0"/>
+                <a:t>Experiments</a:t>
+              </a:r>
+              <a:endParaRPr lang="en-US" sz="3200" b="1" dirty="0"/>
+            </a:p>
+          </p:txBody>
+        </p:sp>
+      </p:grpSp>
       <p:pic>
         <p:nvPicPr>
-          <p:cNvPr id="1027" name="Picture 3" descr="C:\Users\Ivo\Desktop\simulator.png"/>
+          <p:cNvPr id="6" name="Picture 2" descr="C:\Users\Ivo\Desktop\Experiments.png"/>
           <p:cNvPicPr>
             <a:picLocks noChangeAspect="1" noChangeArrowheads="1"/>
           </p:cNvPicPr>
           <p:nvPr/>
         </p:nvPicPr>
         <p:blipFill>
-          <a:blip r:embed="rId3">
+          <a:blip r:embed="rId8">
             <a:extLst>
               <a:ext uri="{28A0092B-C50C-407E-A947-70E740481C1C}">
                 <a14:useLocalDpi xmlns:a14="http://schemas.microsoft.com/office/drawing/2010/main" val="0"/>
@@ -3147,8 +3718,8 @@
         </p:blipFill>
         <p:spPr bwMode="auto">
           <a:xfrm>
-            <a:off x="3581400" y="76200"/>
-            <a:ext cx="3048000" cy="2794000"/>
+            <a:off x="6983811" y="-44488"/>
+            <a:ext cx="2868612" cy="3011975"/>
           </a:xfrm>
           <a:prstGeom prst="roundRect">
             <a:avLst>
@@ -3193,14 +3764,14 @@
       </p:pic>
       <p:pic>
         <p:nvPicPr>
-          <p:cNvPr id="1028" name="Picture 4" descr="C:\Users\Ivo\Desktop\Game1.jpg"/>
+          <p:cNvPr id="10" name="Picture 3" descr="C:\Users\Ivo\Desktop\Navigator.png"/>
           <p:cNvPicPr>
             <a:picLocks noChangeAspect="1" noChangeArrowheads="1"/>
           </p:cNvPicPr>
           <p:nvPr/>
         </p:nvPicPr>
         <p:blipFill>
-          <a:blip r:embed="rId4">
+          <a:blip r:embed="rId9">
             <a:extLst>
               <a:ext uri="{28A0092B-C50C-407E-A947-70E740481C1C}">
                 <a14:useLocalDpi xmlns:a14="http://schemas.microsoft.com/office/drawing/2010/main" val="0"/>
@@ -3214,8 +3785,8 @@
         </p:blipFill>
         <p:spPr bwMode="auto">
           <a:xfrm>
-            <a:off x="-109538" y="2841625"/>
-            <a:ext cx="3657601" cy="3810000"/>
+            <a:off x="2982687" y="3177101"/>
+            <a:ext cx="2979737" cy="3151358"/>
           </a:xfrm>
           <a:prstGeom prst="roundRect">
             <a:avLst>
@@ -3258,274 +3829,118 @@
           </a:extLst>
         </p:spPr>
       </p:pic>
-      <p:pic>
-        <p:nvPicPr>
-          <p:cNvPr id="1030" name="Picture 6" descr="C:\Users\Ivo\Desktop\Picture1.png"/>
-          <p:cNvPicPr>
-            <a:picLocks noChangeAspect="1" noChangeArrowheads="1"/>
-          </p:cNvPicPr>
+      <p:grpSp>
+        <p:nvGrpSpPr>
+          <p:cNvPr id="17" name="Group 16"/>
+          <p:cNvGrpSpPr/>
           <p:nvPr/>
-        </p:nvPicPr>
-        <p:blipFill>
-          <a:blip r:embed="rId5">
+        </p:nvGrpSpPr>
+        <p:grpSpPr>
+          <a:xfrm>
+            <a:off x="6530975" y="2706688"/>
+            <a:ext cx="2672978" cy="2805557"/>
+            <a:chOff x="6530975" y="2706688"/>
+            <a:chExt cx="2672978" cy="2805557"/>
+          </a:xfrm>
+        </p:grpSpPr>
+        <p:pic>
+          <p:nvPicPr>
+            <p:cNvPr id="1032" name="Picture 8" descr="C:\Users\Ivo\Desktop\Docs.png"/>
+            <p:cNvPicPr>
+              <a:picLocks noChangeAspect="1" noChangeArrowheads="1"/>
+            </p:cNvPicPr>
+            <p:nvPr/>
+          </p:nvPicPr>
+          <p:blipFill>
+            <a:blip r:embed="rId10" cstate="print">
+              <a:extLst>
+                <a:ext uri="{28A0092B-C50C-407E-A947-70E740481C1C}">
+                  <a14:useLocalDpi xmlns:a14="http://schemas.microsoft.com/office/drawing/2010/main" val="0"/>
+                </a:ext>
+              </a:extLst>
+            </a:blip>
+            <a:srcRect/>
+            <a:stretch>
+              <a:fillRect/>
+            </a:stretch>
+          </p:blipFill>
+          <p:spPr bwMode="auto">
+            <a:xfrm>
+              <a:off x="6530975" y="2706688"/>
+              <a:ext cx="2672978" cy="2779712"/>
+            </a:xfrm>
+            <a:prstGeom prst="roundRect">
+              <a:avLst>
+                <a:gd name="adj" fmla="val 11111"/>
+              </a:avLst>
+            </a:prstGeom>
+            <a:ln w="190500" cap="rnd">
+              <a:solidFill>
+                <a:srgbClr val="C8C6BD"/>
+              </a:solidFill>
+              <a:prstDash val="solid"/>
+            </a:ln>
+            <a:effectLst>
+              <a:outerShdw blurRad="101600" dist="50800" dir="7200000" algn="tl" rotWithShape="0">
+                <a:srgbClr val="000000">
+                  <a:alpha val="45000"/>
+                </a:srgbClr>
+              </a:outerShdw>
+            </a:effectLst>
+            <a:scene3d>
+              <a:camera prst="perspectiveFront" fov="5400000"/>
+              <a:lightRig rig="threePt" dir="t">
+                <a:rot lat="0" lon="0" rev="19200000"/>
+              </a:lightRig>
+            </a:scene3d>
+            <a:sp3d extrusionH="25400">
+              <a:bevelT w="304800" h="152400" prst="hardEdge"/>
+              <a:extrusionClr>
+                <a:srgbClr val="FFFFFF"/>
+              </a:extrusionClr>
+            </a:sp3d>
             <a:extLst>
-              <a:ext uri="{28A0092B-C50C-407E-A947-70E740481C1C}">
-                <a14:useLocalDpi xmlns:a14="http://schemas.microsoft.com/office/drawing/2010/main" val="0"/>
+              <a:ext uri="{909E8E84-426E-40DD-AFC4-6F175D3DCCD1}">
+                <a14:hiddenFill xmlns:a14="http://schemas.microsoft.com/office/drawing/2010/main">
+                  <a:solidFill>
+                    <a:srgbClr val="FFFFFF"/>
+                  </a:solidFill>
+                </a14:hiddenFill>
               </a:ext>
             </a:extLst>
-          </a:blip>
-          <a:srcRect/>
-          <a:stretch>
-            <a:fillRect/>
-          </a:stretch>
-        </p:blipFill>
-        <p:spPr bwMode="auto">
-          <a:xfrm>
-            <a:off x="3886200" y="3106737"/>
-            <a:ext cx="3213100" cy="3279775"/>
-          </a:xfrm>
-          <a:prstGeom prst="roundRect">
-            <a:avLst>
-              <a:gd name="adj" fmla="val 11111"/>
-            </a:avLst>
-          </a:prstGeom>
-          <a:ln w="190500" cap="rnd">
-            <a:solidFill>
-              <a:srgbClr val="C8C6BD"/>
-            </a:solidFill>
-            <a:prstDash val="solid"/>
-          </a:ln>
-          <a:effectLst>
-            <a:outerShdw blurRad="101600" dist="50800" dir="7200000" algn="tl" rotWithShape="0">
-              <a:srgbClr val="000000">
-                <a:alpha val="45000"/>
-              </a:srgbClr>
-            </a:outerShdw>
-          </a:effectLst>
-          <a:scene3d>
-            <a:camera prst="perspectiveFront" fov="5400000"/>
-            <a:lightRig rig="threePt" dir="t">
-              <a:rot lat="0" lon="0" rev="19200000"/>
-            </a:lightRig>
-          </a:scene3d>
-          <a:sp3d extrusionH="25400">
-            <a:bevelT w="304800" h="152400" prst="hardEdge"/>
-            <a:extrusionClr>
-              <a:srgbClr val="FFFFFF"/>
-            </a:extrusionClr>
-          </a:sp3d>
-          <a:extLst>
-            <a:ext uri="{909E8E84-426E-40DD-AFC4-6F175D3DCCD1}">
-              <a14:hiddenFill xmlns:a14="http://schemas.microsoft.com/office/drawing/2010/main">
-                <a:solidFill>
-                  <a:srgbClr val="FFFFFF"/>
-                </a:solidFill>
-              </a14:hiddenFill>
-            </a:ext>
-          </a:extLst>
-        </p:spPr>
-      </p:pic>
-      <p:pic>
-        <p:nvPicPr>
-          <p:cNvPr id="1031" name="Picture 7" descr="C:\Users\Ivo\Desktop\canvas.png"/>
-          <p:cNvPicPr>
-            <a:picLocks noChangeAspect="1" noChangeArrowheads="1"/>
-          </p:cNvPicPr>
-          <p:nvPr/>
-        </p:nvPicPr>
-        <p:blipFill>
-          <a:blip r:embed="rId6">
-            <a:extLst>
-              <a:ext uri="{28A0092B-C50C-407E-A947-70E740481C1C}">
-                <a14:useLocalDpi xmlns:a14="http://schemas.microsoft.com/office/drawing/2010/main" val="0"/>
-              </a:ext>
-            </a:extLst>
-          </a:blip>
-          <a:srcRect/>
-          <a:stretch>
-            <a:fillRect/>
-          </a:stretch>
-        </p:blipFill>
-        <p:spPr bwMode="auto">
-          <a:xfrm>
-            <a:off x="6735763" y="-42863"/>
-            <a:ext cx="2028825" cy="2000251"/>
-          </a:xfrm>
-          <a:prstGeom prst="roundRect">
-            <a:avLst>
-              <a:gd name="adj" fmla="val 11111"/>
-            </a:avLst>
-          </a:prstGeom>
-          <a:ln w="190500" cap="rnd">
-            <a:solidFill>
-              <a:srgbClr val="C8C6BD"/>
-            </a:solidFill>
-            <a:prstDash val="solid"/>
-          </a:ln>
-          <a:effectLst>
-            <a:outerShdw blurRad="101600" dist="50800" dir="7200000" algn="tl" rotWithShape="0">
-              <a:srgbClr val="000000">
-                <a:alpha val="45000"/>
-              </a:srgbClr>
-            </a:outerShdw>
-          </a:effectLst>
-          <a:scene3d>
-            <a:camera prst="perspectiveFront" fov="5400000"/>
-            <a:lightRig rig="threePt" dir="t">
-              <a:rot lat="0" lon="0" rev="19200000"/>
-            </a:lightRig>
-          </a:scene3d>
-          <a:sp3d extrusionH="25400">
-            <a:bevelT w="304800" h="152400" prst="hardEdge"/>
-            <a:extrusionClr>
-              <a:srgbClr val="FFFFFF"/>
-            </a:extrusionClr>
-          </a:sp3d>
-          <a:extLst>
-            <a:ext uri="{909E8E84-426E-40DD-AFC4-6F175D3DCCD1}">
-              <a14:hiddenFill xmlns:a14="http://schemas.microsoft.com/office/drawing/2010/main">
-                <a:solidFill>
-                  <a:srgbClr val="FFFFFF"/>
-                </a:solidFill>
-              </a14:hiddenFill>
-            </a:ext>
-          </a:extLst>
-        </p:spPr>
-      </p:pic>
-      <p:pic>
-        <p:nvPicPr>
-          <p:cNvPr id="1032" name="Picture 8" descr="C:\Users\Ivo\Desktop\Docs.png"/>
-          <p:cNvPicPr>
-            <a:picLocks noChangeAspect="1" noChangeArrowheads="1"/>
-          </p:cNvPicPr>
-          <p:nvPr/>
-        </p:nvPicPr>
-        <p:blipFill>
-          <a:blip r:embed="rId7" cstate="print">
-            <a:extLst>
-              <a:ext uri="{28A0092B-C50C-407E-A947-70E740481C1C}">
-                <a14:useLocalDpi xmlns:a14="http://schemas.microsoft.com/office/drawing/2010/main" val="0"/>
-              </a:ext>
-            </a:extLst>
-          </a:blip>
-          <a:srcRect/>
-          <a:stretch>
-            <a:fillRect/>
-          </a:stretch>
-        </p:blipFill>
-        <p:spPr bwMode="auto">
-          <a:xfrm>
-            <a:off x="6530975" y="2706688"/>
-            <a:ext cx="1828800" cy="1901825"/>
-          </a:xfrm>
-          <a:prstGeom prst="roundRect">
-            <a:avLst>
-              <a:gd name="adj" fmla="val 11111"/>
-            </a:avLst>
-          </a:prstGeom>
-          <a:ln w="190500" cap="rnd">
-            <a:solidFill>
-              <a:srgbClr val="C8C6BD"/>
-            </a:solidFill>
-            <a:prstDash val="solid"/>
-          </a:ln>
-          <a:effectLst>
-            <a:outerShdw blurRad="101600" dist="50800" dir="7200000" algn="tl" rotWithShape="0">
-              <a:srgbClr val="000000">
-                <a:alpha val="45000"/>
-              </a:srgbClr>
-            </a:outerShdw>
-          </a:effectLst>
-          <a:scene3d>
-            <a:camera prst="perspectiveFront" fov="5400000"/>
-            <a:lightRig rig="threePt" dir="t">
-              <a:rot lat="0" lon="0" rev="19200000"/>
-            </a:lightRig>
-          </a:scene3d>
-          <a:sp3d extrusionH="25400">
-            <a:bevelT w="304800" h="152400" prst="hardEdge"/>
-            <a:extrusionClr>
-              <a:srgbClr val="FFFFFF"/>
-            </a:extrusionClr>
-          </a:sp3d>
-          <a:extLst>
-            <a:ext uri="{909E8E84-426E-40DD-AFC4-6F175D3DCCD1}">
-              <a14:hiddenFill xmlns:a14="http://schemas.microsoft.com/office/drawing/2010/main">
-                <a:solidFill>
-                  <a:srgbClr val="FFFFFF"/>
-                </a:solidFill>
-              </a14:hiddenFill>
-            </a:ext>
-          </a:extLst>
-        </p:spPr>
-      </p:pic>
-      <p:pic>
-        <p:nvPicPr>
-          <p:cNvPr id="2" name="Picture 2" descr="C:\Users\Ivo\Desktop\Game.png"/>
-          <p:cNvPicPr>
-            <a:picLocks noChangeAspect="1" noChangeArrowheads="1"/>
-          </p:cNvPicPr>
-          <p:nvPr/>
-        </p:nvPicPr>
-        <p:blipFill>
-          <a:blip r:embed="rId8">
-            <a:extLst>
-              <a:ext uri="{28A0092B-C50C-407E-A947-70E740481C1C}">
-                <a14:useLocalDpi xmlns:a14="http://schemas.microsoft.com/office/drawing/2010/main" val="0"/>
-              </a:ext>
-            </a:extLst>
-          </a:blip>
-          <a:srcRect/>
-          <a:stretch>
-            <a:fillRect/>
-          </a:stretch>
-        </p:blipFill>
-        <p:spPr bwMode="auto">
-          <a:xfrm flipH="1">
-            <a:off x="6261100" y="3851275"/>
-            <a:ext cx="2543175" cy="2857500"/>
-          </a:xfrm>
-          <a:prstGeom prst="roundRect">
-            <a:avLst>
-              <a:gd name="adj" fmla="val 11111"/>
-            </a:avLst>
-          </a:prstGeom>
-          <a:ln w="190500" cap="rnd">
-            <a:solidFill>
-              <a:srgbClr val="C8C6BD"/>
-            </a:solidFill>
-            <a:prstDash val="solid"/>
-          </a:ln>
-          <a:effectLst>
-            <a:outerShdw blurRad="101600" dist="50800" dir="7200000" algn="tl" rotWithShape="0">
-              <a:srgbClr val="000000">
-                <a:alpha val="45000"/>
-              </a:srgbClr>
-            </a:outerShdw>
-          </a:effectLst>
-          <a:scene3d>
-            <a:camera prst="perspectiveFront" fov="5400000"/>
-            <a:lightRig rig="threePt" dir="t">
-              <a:rot lat="0" lon="0" rev="19200000"/>
-            </a:lightRig>
-          </a:scene3d>
-          <a:sp3d extrusionH="25400">
-            <a:bevelT w="304800" h="152400" prst="hardEdge"/>
-            <a:extrusionClr>
-              <a:srgbClr val="FFFFFF"/>
-            </a:extrusionClr>
-          </a:sp3d>
-          <a:extLst>
-            <a:ext uri="{909E8E84-426E-40DD-AFC4-6F175D3DCCD1}">
-              <a14:hiddenFill xmlns:a14="http://schemas.microsoft.com/office/drawing/2010/main">
-                <a:solidFill>
-                  <a:srgbClr val="FFFFFF"/>
-                </a:solidFill>
-              </a14:hiddenFill>
-            </a:ext>
-          </a:extLst>
-        </p:spPr>
-      </p:pic>
+          </p:spPr>
+        </p:pic>
+        <p:sp>
+          <p:nvSpPr>
+            <p:cNvPr id="23" name="TextBox 22"/>
+            <p:cNvSpPr txBox="1"/>
+            <p:nvPr/>
+          </p:nvSpPr>
+          <p:spPr>
+            <a:xfrm>
+              <a:off x="7314930" y="4865914"/>
+              <a:ext cx="1103187" cy="646331"/>
+            </a:xfrm>
+            <a:prstGeom prst="rect">
+              <a:avLst/>
+            </a:prstGeom>
+            <a:noFill/>
+          </p:spPr>
+          <p:txBody>
+            <a:bodyPr wrap="none" rtlCol="0">
+              <a:spAutoFit/>
+            </a:bodyPr>
+            <a:lstStyle/>
+            <a:p>
+              <a:r>
+                <a:rPr lang="en-US" sz="3600" b="1" dirty="0" smtClean="0"/>
+                <a:t>Docs</a:t>
+              </a:r>
+              <a:endParaRPr lang="en-US" sz="3200" b="1" dirty="0"/>
+            </a:p>
+          </p:txBody>
+        </p:sp>
+      </p:grpSp>
     </p:spTree>
     <p:extLst>
       <p:ext uri="{BB962C8B-B14F-4D97-AF65-F5344CB8AC3E}">

</xml_diff>